<commit_message>
add Proficiency in model class diagram
</commit_message>
<xml_diff>
--- a/docs/diagrams/ModelComponentClassBetterOopDiagram.pptx
+++ b/docs/diagrams/ModelComponentClassBetterOopDiagram.pptx
@@ -208,7 +208,7 @@
           <a:p>
             <a:fld id="{F5CC4B3F-88C1-4FFA-B1B6-F41C21DC6924}" type="datetimeFigureOut">
               <a:rPr lang="en-US" smtClean="0"/>
-              <a:t>4/14/19</a:t>
+              <a:t>4/15/19</a:t>
             </a:fld>
             <a:endParaRPr lang="en-US"/>
           </a:p>
@@ -654,7 +654,7 @@
           <a:p>
             <a:fld id="{78C97017-6FC3-485B-9764-EAC9E56C1D49}" type="datetimeFigureOut">
               <a:rPr lang="en-US" smtClean="0"/>
-              <a:t>4/14/19</a:t>
+              <a:t>4/15/19</a:t>
             </a:fld>
             <a:endParaRPr lang="en-US"/>
           </a:p>
@@ -822,7 +822,7 @@
           <a:p>
             <a:fld id="{78C97017-6FC3-485B-9764-EAC9E56C1D49}" type="datetimeFigureOut">
               <a:rPr lang="en-US" smtClean="0"/>
-              <a:t>4/14/19</a:t>
+              <a:t>4/15/19</a:t>
             </a:fld>
             <a:endParaRPr lang="en-US"/>
           </a:p>
@@ -1000,7 +1000,7 @@
           <a:p>
             <a:fld id="{78C97017-6FC3-485B-9764-EAC9E56C1D49}" type="datetimeFigureOut">
               <a:rPr lang="en-US" smtClean="0"/>
-              <a:t>4/14/19</a:t>
+              <a:t>4/15/19</a:t>
             </a:fld>
             <a:endParaRPr lang="en-US"/>
           </a:p>
@@ -1168,7 +1168,7 @@
           <a:p>
             <a:fld id="{78C97017-6FC3-485B-9764-EAC9E56C1D49}" type="datetimeFigureOut">
               <a:rPr lang="en-US" smtClean="0"/>
-              <a:t>4/14/19</a:t>
+              <a:t>4/15/19</a:t>
             </a:fld>
             <a:endParaRPr lang="en-US"/>
           </a:p>
@@ -1413,7 +1413,7 @@
           <a:p>
             <a:fld id="{78C97017-6FC3-485B-9764-EAC9E56C1D49}" type="datetimeFigureOut">
               <a:rPr lang="en-US" smtClean="0"/>
-              <a:t>4/14/19</a:t>
+              <a:t>4/15/19</a:t>
             </a:fld>
             <a:endParaRPr lang="en-US"/>
           </a:p>
@@ -1698,7 +1698,7 @@
           <a:p>
             <a:fld id="{78C97017-6FC3-485B-9764-EAC9E56C1D49}" type="datetimeFigureOut">
               <a:rPr lang="en-US" smtClean="0"/>
-              <a:t>4/14/19</a:t>
+              <a:t>4/15/19</a:t>
             </a:fld>
             <a:endParaRPr lang="en-US"/>
           </a:p>
@@ -2117,7 +2117,7 @@
           <a:p>
             <a:fld id="{78C97017-6FC3-485B-9764-EAC9E56C1D49}" type="datetimeFigureOut">
               <a:rPr lang="en-US" smtClean="0"/>
-              <a:t>4/14/19</a:t>
+              <a:t>4/15/19</a:t>
             </a:fld>
             <a:endParaRPr lang="en-US"/>
           </a:p>
@@ -2234,7 +2234,7 @@
           <a:p>
             <a:fld id="{78C97017-6FC3-485B-9764-EAC9E56C1D49}" type="datetimeFigureOut">
               <a:rPr lang="en-US" smtClean="0"/>
-              <a:t>4/14/19</a:t>
+              <a:t>4/15/19</a:t>
             </a:fld>
             <a:endParaRPr lang="en-US"/>
           </a:p>
@@ -2329,7 +2329,7 @@
           <a:p>
             <a:fld id="{78C97017-6FC3-485B-9764-EAC9E56C1D49}" type="datetimeFigureOut">
               <a:rPr lang="en-US" smtClean="0"/>
-              <a:t>4/14/19</a:t>
+              <a:t>4/15/19</a:t>
             </a:fld>
             <a:endParaRPr lang="en-US"/>
           </a:p>
@@ -2604,7 +2604,7 @@
           <a:p>
             <a:fld id="{78C97017-6FC3-485B-9764-EAC9E56C1D49}" type="datetimeFigureOut">
               <a:rPr lang="en-US" smtClean="0"/>
-              <a:t>4/14/19</a:t>
+              <a:t>4/15/19</a:t>
             </a:fld>
             <a:endParaRPr lang="en-US"/>
           </a:p>
@@ -2856,7 +2856,7 @@
           <a:p>
             <a:fld id="{78C97017-6FC3-485B-9764-EAC9E56C1D49}" type="datetimeFigureOut">
               <a:rPr lang="en-US" smtClean="0"/>
-              <a:t>4/14/19</a:t>
+              <a:t>4/15/19</a:t>
             </a:fld>
             <a:endParaRPr lang="en-US"/>
           </a:p>
@@ -3067,7 +3067,7 @@
           <a:p>
             <a:fld id="{78C97017-6FC3-485B-9764-EAC9E56C1D49}" type="datetimeFigureOut">
               <a:rPr lang="en-US" smtClean="0"/>
-              <a:t>4/14/19</a:t>
+              <a:t>4/15/19</a:t>
             </a:fld>
             <a:endParaRPr lang="en-US"/>
           </a:p>
@@ -3753,7 +3753,7 @@
         <p:spPr>
           <a:xfrm>
             <a:off x="6911814" y="3053948"/>
-            <a:ext cx="756000" cy="285783"/>
+            <a:ext cx="865280" cy="285783"/>
           </a:xfrm>
           <a:prstGeom prst="rect">
             <a:avLst/>
@@ -3896,7 +3896,7 @@
         <p:spPr>
           <a:xfrm>
             <a:off x="6911814" y="3376926"/>
-            <a:ext cx="756000" cy="285783"/>
+            <a:ext cx="865280" cy="285783"/>
           </a:xfrm>
           <a:prstGeom prst="rect">
             <a:avLst/>
@@ -3947,6 +3947,7 @@
         <p:nvCxnSpPr>
           <p:cNvPr id="81" name="Elbow Connector 80"/>
           <p:cNvCxnSpPr>
+            <a:cxnSpLocks/>
             <a:stCxn id="78" idx="3"/>
             <a:endCxn id="80" idx="1"/>
           </p:cNvCxnSpPr>
@@ -3993,7 +3994,7 @@
         <p:spPr>
           <a:xfrm>
             <a:off x="6911814" y="3699904"/>
-            <a:ext cx="756000" cy="285783"/>
+            <a:ext cx="865280" cy="285783"/>
           </a:xfrm>
           <a:prstGeom prst="rect">
             <a:avLst/>
@@ -4044,6 +4045,7 @@
         <p:nvCxnSpPr>
           <p:cNvPr id="84" name="Elbow Connector 83"/>
           <p:cNvCxnSpPr>
+            <a:cxnSpLocks/>
             <a:stCxn id="78" idx="3"/>
             <a:endCxn id="83" idx="1"/>
           </p:cNvCxnSpPr>
@@ -4090,7 +4092,7 @@
         <p:spPr>
           <a:xfrm>
             <a:off x="6911814" y="4022881"/>
-            <a:ext cx="756000" cy="285783"/>
+            <a:ext cx="865280" cy="285783"/>
           </a:xfrm>
           <a:prstGeom prst="rect">
             <a:avLst/>
@@ -4802,6 +4804,118 @@
           </a:effectRef>
           <a:fontRef idx="minor">
             <a:schemeClr val="tx1"/>
+          </a:fontRef>
+        </p:style>
+      </p:cxnSp>
+      <p:sp>
+        <p:nvSpPr>
+          <p:cNvPr id="36" name="Rectangle 8">
+            <a:extLst>
+              <a:ext uri="{FF2B5EF4-FFF2-40B4-BE49-F238E27FC236}">
+                <a16:creationId xmlns:a16="http://schemas.microsoft.com/office/drawing/2014/main" id="{DE62164C-28D9-1445-B709-08117B1FD7B5}"/>
+              </a:ext>
+            </a:extLst>
+          </p:cNvPr>
+          <p:cNvSpPr/>
+          <p:nvPr/>
+        </p:nvSpPr>
+        <p:spPr>
+          <a:xfrm>
+            <a:off x="6911814" y="4361296"/>
+            <a:ext cx="865280" cy="285783"/>
+          </a:xfrm>
+          <a:prstGeom prst="rect">
+            <a:avLst/>
+          </a:prstGeom>
+          <a:ln w="19050">
+            <a:solidFill>
+              <a:srgbClr val="7030A0"/>
+            </a:solidFill>
+          </a:ln>
+          <a:effectLst/>
+        </p:spPr>
+        <p:style>
+          <a:lnRef idx="1">
+            <a:schemeClr val="accent4"/>
+          </a:lnRef>
+          <a:fillRef idx="2">
+            <a:schemeClr val="accent4"/>
+          </a:fillRef>
+          <a:effectRef idx="1">
+            <a:schemeClr val="accent4"/>
+          </a:effectRef>
+          <a:fontRef idx="minor">
+            <a:schemeClr val="dk1"/>
+          </a:fontRef>
+        </p:style>
+        <p:txBody>
+          <a:bodyPr rtlCol="0" anchor="ctr"/>
+          <a:lstStyle/>
+          <a:p>
+            <a:pPr algn="ctr"/>
+            <a:r>
+              <a:rPr lang="en-US" sz="1050" dirty="0">
+                <a:solidFill>
+                  <a:srgbClr val="7030A0"/>
+                </a:solidFill>
+              </a:rPr>
+              <a:t>Proficiency</a:t>
+            </a:r>
+            <a:endParaRPr lang="en-SG" sz="1050" dirty="0">
+              <a:solidFill>
+                <a:srgbClr val="7030A0"/>
+              </a:solidFill>
+            </a:endParaRPr>
+          </a:p>
+        </p:txBody>
+      </p:sp>
+      <p:cxnSp>
+        <p:nvCxnSpPr>
+          <p:cNvPr id="37" name="Elbow Connector 36">
+            <a:extLst>
+              <a:ext uri="{FF2B5EF4-FFF2-40B4-BE49-F238E27FC236}">
+                <a16:creationId xmlns:a16="http://schemas.microsoft.com/office/drawing/2014/main" id="{535655ED-83C3-D94F-8D0F-828C3A284F3A}"/>
+              </a:ext>
+            </a:extLst>
+          </p:cNvPr>
+          <p:cNvCxnSpPr>
+            <a:cxnSpLocks/>
+            <a:stCxn id="78" idx="3"/>
+            <a:endCxn id="36" idx="1"/>
+          </p:cNvCxnSpPr>
+          <p:nvPr/>
+        </p:nvCxnSpPr>
+        <p:spPr>
+          <a:xfrm>
+            <a:off x="6477412" y="3524601"/>
+            <a:ext cx="434402" cy="979587"/>
+          </a:xfrm>
+          <a:prstGeom prst="bentConnector3">
+            <a:avLst>
+              <a:gd name="adj1" fmla="val 50000"/>
+            </a:avLst>
+          </a:prstGeom>
+          <a:ln w="19050">
+            <a:solidFill>
+              <a:srgbClr val="7030A0"/>
+            </a:solidFill>
+            <a:headEnd type="none" w="med" len="med"/>
+            <a:tailEnd type="arrow" w="med" len="med"/>
+          </a:ln>
+          <a:effectLst/>
+        </p:spPr>
+        <p:style>
+          <a:lnRef idx="1">
+            <a:schemeClr val="accent2"/>
+          </a:lnRef>
+          <a:fillRef idx="2">
+            <a:schemeClr val="accent2"/>
+          </a:fillRef>
+          <a:effectRef idx="1">
+            <a:schemeClr val="accent2"/>
+          </a:effectRef>
+          <a:fontRef idx="minor">
+            <a:schemeClr val="dk1"/>
           </a:fontRef>
         </p:style>
       </p:cxnSp>

</xml_diff>